<commit_message>
some instructions on getting it to run without custom action server
</commit_message>
<xml_diff>
--- a/Rasa_Bot/Readme_Images/Dialog_Flow.pptx
+++ b/Rasa_Bot/Readme_Images/Dialog_Flow.pptx
@@ -104,6 +104,11 @@
       </a:defRPr>
     </a:lvl9pPr>
   </p:defaultTextStyle>
+  <p:extLst>
+    <p:ext uri="{EFAFB233-063F-42B5-8137-9DF3F51BA10A}">
+      <p15:sldGuideLst xmlns:p15="http://schemas.microsoft.com/office/powerpoint/2012/main"/>
+    </p:ext>
+  </p:extLst>
 </p:presentation>
 </file>
 
@@ -4528,6 +4533,254 @@
           </a:p>
         </p:txBody>
       </p:sp>
+      <p:sp>
+        <p:nvSpPr>
+          <p:cNvPr id="2" name="Flowchart: Connector 1">
+            <a:extLst>
+              <a:ext uri="{FF2B5EF4-FFF2-40B4-BE49-F238E27FC236}">
+                <a16:creationId xmlns:a16="http://schemas.microsoft.com/office/drawing/2014/main" id="{39C137E3-2186-4534-AB72-9AE18B65D4C3}"/>
+              </a:ext>
+            </a:extLst>
+          </p:cNvPr>
+          <p:cNvSpPr/>
+          <p:nvPr/>
+        </p:nvSpPr>
+        <p:spPr>
+          <a:xfrm>
+            <a:off x="9152389" y="577443"/>
+            <a:ext cx="374904" cy="377504"/>
+          </a:xfrm>
+          <a:prstGeom prst="flowChartConnector">
+            <a:avLst/>
+          </a:prstGeom>
+          <a:solidFill>
+            <a:srgbClr val="92D050"/>
+          </a:solidFill>
+        </p:spPr>
+        <p:style>
+          <a:lnRef idx="2">
+            <a:schemeClr val="accent1">
+              <a:shade val="50000"/>
+            </a:schemeClr>
+          </a:lnRef>
+          <a:fillRef idx="1">
+            <a:schemeClr val="accent1"/>
+          </a:fillRef>
+          <a:effectRef idx="0">
+            <a:schemeClr val="accent1"/>
+          </a:effectRef>
+          <a:fontRef idx="minor">
+            <a:schemeClr val="lt1"/>
+          </a:fontRef>
+        </p:style>
+        <p:txBody>
+          <a:bodyPr rtlCol="0" anchor="ctr"/>
+          <a:lstStyle/>
+          <a:p>
+            <a:pPr algn="ctr"/>
+            <a:endParaRPr lang="LID4096"/>
+          </a:p>
+        </p:txBody>
+      </p:sp>
+      <p:sp>
+        <p:nvSpPr>
+          <p:cNvPr id="3" name="TextBox 2">
+            <a:extLst>
+              <a:ext uri="{FF2B5EF4-FFF2-40B4-BE49-F238E27FC236}">
+                <a16:creationId xmlns:a16="http://schemas.microsoft.com/office/drawing/2014/main" id="{268DDD4A-7C05-43AF-96BE-452A3CC4617B}"/>
+              </a:ext>
+            </a:extLst>
+          </p:cNvPr>
+          <p:cNvSpPr txBox="1"/>
+          <p:nvPr/>
+        </p:nvSpPr>
+        <p:spPr>
+          <a:xfrm>
+            <a:off x="9559451" y="577443"/>
+            <a:ext cx="1682189" cy="369332"/>
+          </a:xfrm>
+          <a:prstGeom prst="rect">
+            <a:avLst/>
+          </a:prstGeom>
+          <a:noFill/>
+        </p:spPr>
+        <p:txBody>
+          <a:bodyPr wrap="square" rtlCol="0">
+            <a:spAutoFit/>
+          </a:bodyPr>
+          <a:lstStyle/>
+          <a:p>
+            <a:r>
+              <a:rPr lang="en-US" dirty="0"/>
+              <a:t>User utterance</a:t>
+            </a:r>
+            <a:endParaRPr lang="LID4096" dirty="0"/>
+          </a:p>
+        </p:txBody>
+      </p:sp>
+      <p:sp>
+        <p:nvSpPr>
+          <p:cNvPr id="29" name="Flowchart: Connector 28">
+            <a:extLst>
+              <a:ext uri="{FF2B5EF4-FFF2-40B4-BE49-F238E27FC236}">
+                <a16:creationId xmlns:a16="http://schemas.microsoft.com/office/drawing/2014/main" id="{A20641B0-30CC-4B76-A57E-6D6B819BC982}"/>
+              </a:ext>
+            </a:extLst>
+          </p:cNvPr>
+          <p:cNvSpPr/>
+          <p:nvPr/>
+        </p:nvSpPr>
+        <p:spPr>
+          <a:xfrm>
+            <a:off x="9152389" y="1032238"/>
+            <a:ext cx="374904" cy="377504"/>
+          </a:xfrm>
+          <a:prstGeom prst="flowChartConnector">
+            <a:avLst/>
+          </a:prstGeom>
+        </p:spPr>
+        <p:style>
+          <a:lnRef idx="2">
+            <a:schemeClr val="accent1">
+              <a:shade val="50000"/>
+            </a:schemeClr>
+          </a:lnRef>
+          <a:fillRef idx="1">
+            <a:schemeClr val="accent1"/>
+          </a:fillRef>
+          <a:effectRef idx="0">
+            <a:schemeClr val="accent1"/>
+          </a:effectRef>
+          <a:fontRef idx="minor">
+            <a:schemeClr val="lt1"/>
+          </a:fontRef>
+        </p:style>
+        <p:txBody>
+          <a:bodyPr rtlCol="0" anchor="ctr"/>
+          <a:lstStyle/>
+          <a:p>
+            <a:pPr algn="ctr"/>
+            <a:endParaRPr lang="LID4096"/>
+          </a:p>
+        </p:txBody>
+      </p:sp>
+      <p:sp>
+        <p:nvSpPr>
+          <p:cNvPr id="30" name="TextBox 29">
+            <a:extLst>
+              <a:ext uri="{FF2B5EF4-FFF2-40B4-BE49-F238E27FC236}">
+                <a16:creationId xmlns:a16="http://schemas.microsoft.com/office/drawing/2014/main" id="{A6201598-5425-4A95-AF7C-DA9AE763E9E6}"/>
+              </a:ext>
+            </a:extLst>
+          </p:cNvPr>
+          <p:cNvSpPr txBox="1"/>
+          <p:nvPr/>
+        </p:nvSpPr>
+        <p:spPr>
+          <a:xfrm>
+            <a:off x="9559451" y="1032238"/>
+            <a:ext cx="1682189" cy="369332"/>
+          </a:xfrm>
+          <a:prstGeom prst="rect">
+            <a:avLst/>
+          </a:prstGeom>
+          <a:noFill/>
+        </p:spPr>
+        <p:txBody>
+          <a:bodyPr wrap="square" rtlCol="0">
+            <a:spAutoFit/>
+          </a:bodyPr>
+          <a:lstStyle/>
+          <a:p>
+            <a:r>
+              <a:rPr lang="en-US" dirty="0"/>
+              <a:t>Agent utterance</a:t>
+            </a:r>
+          </a:p>
+        </p:txBody>
+      </p:sp>
+      <p:sp>
+        <p:nvSpPr>
+          <p:cNvPr id="32" name="Flowchart: Connector 31">
+            <a:extLst>
+              <a:ext uri="{FF2B5EF4-FFF2-40B4-BE49-F238E27FC236}">
+                <a16:creationId xmlns:a16="http://schemas.microsoft.com/office/drawing/2014/main" id="{36B1B754-79D6-4D19-9299-F709A7CC0273}"/>
+              </a:ext>
+            </a:extLst>
+          </p:cNvPr>
+          <p:cNvSpPr/>
+          <p:nvPr/>
+        </p:nvSpPr>
+        <p:spPr>
+          <a:xfrm>
+            <a:off x="9152389" y="1487033"/>
+            <a:ext cx="374904" cy="377504"/>
+          </a:xfrm>
+          <a:prstGeom prst="flowChartConnector">
+            <a:avLst/>
+          </a:prstGeom>
+        </p:spPr>
+        <p:style>
+          <a:lnRef idx="2">
+            <a:schemeClr val="accent3">
+              <a:shade val="50000"/>
+            </a:schemeClr>
+          </a:lnRef>
+          <a:fillRef idx="1">
+            <a:schemeClr val="accent3"/>
+          </a:fillRef>
+          <a:effectRef idx="0">
+            <a:schemeClr val="accent3"/>
+          </a:effectRef>
+          <a:fontRef idx="minor">
+            <a:schemeClr val="lt1"/>
+          </a:fontRef>
+        </p:style>
+        <p:txBody>
+          <a:bodyPr rtlCol="0" anchor="ctr"/>
+          <a:lstStyle/>
+          <a:p>
+            <a:pPr algn="ctr"/>
+            <a:endParaRPr lang="LID4096"/>
+          </a:p>
+        </p:txBody>
+      </p:sp>
+      <p:sp>
+        <p:nvSpPr>
+          <p:cNvPr id="33" name="TextBox 32">
+            <a:extLst>
+              <a:ext uri="{FF2B5EF4-FFF2-40B4-BE49-F238E27FC236}">
+                <a16:creationId xmlns:a16="http://schemas.microsoft.com/office/drawing/2014/main" id="{22B95E61-F208-4CCE-B7D5-A2DD0E9D7A53}"/>
+              </a:ext>
+            </a:extLst>
+          </p:cNvPr>
+          <p:cNvSpPr txBox="1"/>
+          <p:nvPr/>
+        </p:nvSpPr>
+        <p:spPr>
+          <a:xfrm>
+            <a:off x="9559451" y="1487033"/>
+            <a:ext cx="1682189" cy="646331"/>
+          </a:xfrm>
+          <a:prstGeom prst="rect">
+            <a:avLst/>
+          </a:prstGeom>
+          <a:noFill/>
+        </p:spPr>
+        <p:txBody>
+          <a:bodyPr wrap="square" rtlCol="0">
+            <a:spAutoFit/>
+          </a:bodyPr>
+          <a:lstStyle/>
+          <a:p>
+            <a:r>
+              <a:rPr lang="en-US" dirty="0"/>
+              <a:t>Custom action taken by agent</a:t>
+            </a:r>
+            <a:endParaRPr lang="LID4096" dirty="0"/>
+          </a:p>
+        </p:txBody>
+      </p:sp>
     </p:spTree>
     <p:extLst>
       <p:ext uri="{BB962C8B-B14F-4D97-AF65-F5344CB8AC3E}">

</xml_diff>

<commit_message>
incorporate comments on pull request
</commit_message>
<xml_diff>
--- a/Rasa_Bot/Readme_Images/Dialog_Flow.pptx
+++ b/Rasa_Bot/Readme_Images/Dialog_Flow.pptx
@@ -261,7 +261,7 @@
           <a:p>
             <a:fld id="{ED9CCB52-56FE-42E5-B0D4-D20410F16FFD}" type="datetimeFigureOut">
               <a:rPr lang="LID4096" smtClean="0"/>
-              <a:t>04/28/2021</a:t>
+              <a:t>05/10/2021</a:t>
             </a:fld>
             <a:endParaRPr lang="LID4096"/>
           </a:p>
@@ -461,7 +461,7 @@
           <a:p>
             <a:fld id="{ED9CCB52-56FE-42E5-B0D4-D20410F16FFD}" type="datetimeFigureOut">
               <a:rPr lang="LID4096" smtClean="0"/>
-              <a:t>04/28/2021</a:t>
+              <a:t>05/10/2021</a:t>
             </a:fld>
             <a:endParaRPr lang="LID4096"/>
           </a:p>
@@ -671,7 +671,7 @@
           <a:p>
             <a:fld id="{ED9CCB52-56FE-42E5-B0D4-D20410F16FFD}" type="datetimeFigureOut">
               <a:rPr lang="LID4096" smtClean="0"/>
-              <a:t>04/28/2021</a:t>
+              <a:t>05/10/2021</a:t>
             </a:fld>
             <a:endParaRPr lang="LID4096"/>
           </a:p>
@@ -871,7 +871,7 @@
           <a:p>
             <a:fld id="{ED9CCB52-56FE-42E5-B0D4-D20410F16FFD}" type="datetimeFigureOut">
               <a:rPr lang="LID4096" smtClean="0"/>
-              <a:t>04/28/2021</a:t>
+              <a:t>05/10/2021</a:t>
             </a:fld>
             <a:endParaRPr lang="LID4096"/>
           </a:p>
@@ -1147,7 +1147,7 @@
           <a:p>
             <a:fld id="{ED9CCB52-56FE-42E5-B0D4-D20410F16FFD}" type="datetimeFigureOut">
               <a:rPr lang="LID4096" smtClean="0"/>
-              <a:t>04/28/2021</a:t>
+              <a:t>05/10/2021</a:t>
             </a:fld>
             <a:endParaRPr lang="LID4096"/>
           </a:p>
@@ -1415,7 +1415,7 @@
           <a:p>
             <a:fld id="{ED9CCB52-56FE-42E5-B0D4-D20410F16FFD}" type="datetimeFigureOut">
               <a:rPr lang="LID4096" smtClean="0"/>
-              <a:t>04/28/2021</a:t>
+              <a:t>05/10/2021</a:t>
             </a:fld>
             <a:endParaRPr lang="LID4096"/>
           </a:p>
@@ -1830,7 +1830,7 @@
           <a:p>
             <a:fld id="{ED9CCB52-56FE-42E5-B0D4-D20410F16FFD}" type="datetimeFigureOut">
               <a:rPr lang="LID4096" smtClean="0"/>
-              <a:t>04/28/2021</a:t>
+              <a:t>05/10/2021</a:t>
             </a:fld>
             <a:endParaRPr lang="LID4096"/>
           </a:p>
@@ -1972,7 +1972,7 @@
           <a:p>
             <a:fld id="{ED9CCB52-56FE-42E5-B0D4-D20410F16FFD}" type="datetimeFigureOut">
               <a:rPr lang="LID4096" smtClean="0"/>
-              <a:t>04/28/2021</a:t>
+              <a:t>05/10/2021</a:t>
             </a:fld>
             <a:endParaRPr lang="LID4096"/>
           </a:p>
@@ -2085,7 +2085,7 @@
           <a:p>
             <a:fld id="{ED9CCB52-56FE-42E5-B0D4-D20410F16FFD}" type="datetimeFigureOut">
               <a:rPr lang="LID4096" smtClean="0"/>
-              <a:t>04/28/2021</a:t>
+              <a:t>05/10/2021</a:t>
             </a:fld>
             <a:endParaRPr lang="LID4096"/>
           </a:p>
@@ -2398,7 +2398,7 @@
           <a:p>
             <a:fld id="{ED9CCB52-56FE-42E5-B0D4-D20410F16FFD}" type="datetimeFigureOut">
               <a:rPr lang="LID4096" smtClean="0"/>
-              <a:t>04/28/2021</a:t>
+              <a:t>05/10/2021</a:t>
             </a:fld>
             <a:endParaRPr lang="LID4096"/>
           </a:p>
@@ -2687,7 +2687,7 @@
           <a:p>
             <a:fld id="{ED9CCB52-56FE-42E5-B0D4-D20410F16FFD}" type="datetimeFigureOut">
               <a:rPr lang="LID4096" smtClean="0"/>
-              <a:t>04/28/2021</a:t>
+              <a:t>05/10/2021</a:t>
             </a:fld>
             <a:endParaRPr lang="LID4096"/>
           </a:p>
@@ -2930,7 +2930,7 @@
           <a:p>
             <a:fld id="{ED9CCB52-56FE-42E5-B0D4-D20410F16FFD}" type="datetimeFigureOut">
               <a:rPr lang="LID4096" smtClean="0"/>
-              <a:t>04/28/2021</a:t>
+              <a:t>05/10/2021</a:t>
             </a:fld>
             <a:endParaRPr lang="LID4096"/>
           </a:p>
@@ -3361,8 +3361,8 @@
         </p:nvSpPr>
         <p:spPr>
           <a:xfrm>
-            <a:off x="4749567" y="177567"/>
-            <a:ext cx="2457974" cy="461394"/>
+            <a:off x="4749567" y="100668"/>
+            <a:ext cx="2457974" cy="538293"/>
           </a:xfrm>
           <a:prstGeom prst="flowChartProcess">
             <a:avLst/>
@@ -3394,7 +3394,15 @@
             <a:pPr algn="ctr"/>
             <a:r>
               <a:rPr lang="en-US" dirty="0"/>
-              <a:t>“Can I get the planning for next week?”</a:t>
+              <a:t>“</a:t>
+            </a:r>
+            <a:r>
+              <a:rPr lang="nl-NL" dirty="0"/>
+              <a:t>Kan ik de agende voor de week krijgen</a:t>
+            </a:r>
+            <a:r>
+              <a:rPr lang="en-US" dirty="0"/>
+              <a:t>?”</a:t>
             </a:r>
             <a:endParaRPr lang="LID4096" dirty="0"/>
           </a:p>
@@ -3644,7 +3652,15 @@
             <a:pPr algn="ctr"/>
             <a:r>
               <a:rPr lang="en-US" dirty="0"/>
-              <a:t>“Do you want me to add this plan to you calendar?”</a:t>
+              <a:t>“</a:t>
+            </a:r>
+            <a:r>
+              <a:rPr lang="nl-NL" dirty="0"/>
+              <a:t>Zal ik de planning in je NiceDay agenda zetten</a:t>
+            </a:r>
+            <a:r>
+              <a:rPr lang="en-US" dirty="0"/>
+              <a:t>?”</a:t>
             </a:r>
             <a:endParaRPr lang="LID4096" dirty="0"/>
           </a:p>
@@ -3697,7 +3713,7 @@
             <a:pPr algn="ctr"/>
             <a:r>
               <a:rPr lang="en-US" dirty="0"/>
-              <a:t>“Yes”</a:t>
+              <a:t>“Ja”</a:t>
             </a:r>
             <a:endParaRPr lang="LID4096" dirty="0"/>
           </a:p>
@@ -3750,7 +3766,7 @@
             <a:pPr algn="ctr"/>
             <a:r>
               <a:rPr lang="en-US" dirty="0"/>
-              <a:t>“No”</a:t>
+              <a:t>“Nee”</a:t>
             </a:r>
             <a:endParaRPr lang="LID4096" dirty="0"/>
           </a:p>
@@ -3871,7 +3887,7 @@
         <p:spPr>
           <a:xfrm>
             <a:off x="0" y="5568893"/>
-            <a:ext cx="2457974" cy="461394"/>
+            <a:ext cx="2457974" cy="890630"/>
           </a:xfrm>
           <a:prstGeom prst="flowChartProcess">
             <a:avLst/>
@@ -3899,8 +3915,12 @@
           <a:p>
             <a:pPr algn="ctr"/>
             <a:r>
+              <a:rPr lang="nl-NL" dirty="0"/>
+              <a:t>“Okay, de planning staat nu in je NiceDay agenda</a:t>
+            </a:r>
+            <a:r>
               <a:rPr lang="en-US" dirty="0"/>
-              <a:t>“Okay, it’s in your calendar now.”</a:t>
+              <a:t>.”</a:t>
             </a:r>
             <a:endParaRPr lang="LID4096" dirty="0"/>
           </a:p>
@@ -3950,7 +3970,15 @@
             <a:pPr algn="ctr"/>
             <a:r>
               <a:rPr lang="en-US" dirty="0"/>
-              <a:t>“I’m sorry, I can’t save the plan in your calendar at the moment.”</a:t>
+              <a:t>“</a:t>
+            </a:r>
+            <a:r>
+              <a:rPr lang="nl-NL" dirty="0"/>
+              <a:t>Sorry, ik kan de planning nu niet invoeren</a:t>
+            </a:r>
+            <a:r>
+              <a:rPr lang="en-US" dirty="0"/>
+              <a:t>.”</a:t>
             </a:r>
             <a:endParaRPr lang="LID4096" dirty="0"/>
           </a:p>
@@ -3966,6 +3994,7 @@
             </a:extLst>
           </p:cNvPr>
           <p:cNvCxnSpPr>
+            <a:cxnSpLocks/>
             <a:stCxn id="5" idx="2"/>
             <a:endCxn id="6" idx="0"/>
           </p:cNvCxnSpPr>

</xml_diff>

<commit_message>
augmented memoization policy, adapting config, nlu fallback, more nlu training examples, intents in domain.yml
</commit_message>
<xml_diff>
--- a/Rasa_Bot/Readme_Images/Dialog_Flow.pptx
+++ b/Rasa_Bot/Readme_Images/Dialog_Flow.pptx
@@ -261,7 +261,7 @@
           <a:p>
             <a:fld id="{ED9CCB52-56FE-42E5-B0D4-D20410F16FFD}" type="datetimeFigureOut">
               <a:rPr lang="LID4096" smtClean="0"/>
-              <a:t>05/10/2021</a:t>
+              <a:t>08/20/2021</a:t>
             </a:fld>
             <a:endParaRPr lang="LID4096"/>
           </a:p>
@@ -461,7 +461,7 @@
           <a:p>
             <a:fld id="{ED9CCB52-56FE-42E5-B0D4-D20410F16FFD}" type="datetimeFigureOut">
               <a:rPr lang="LID4096" smtClean="0"/>
-              <a:t>05/10/2021</a:t>
+              <a:t>08/20/2021</a:t>
             </a:fld>
             <a:endParaRPr lang="LID4096"/>
           </a:p>
@@ -671,7 +671,7 @@
           <a:p>
             <a:fld id="{ED9CCB52-56FE-42E5-B0D4-D20410F16FFD}" type="datetimeFigureOut">
               <a:rPr lang="LID4096" smtClean="0"/>
-              <a:t>05/10/2021</a:t>
+              <a:t>08/20/2021</a:t>
             </a:fld>
             <a:endParaRPr lang="LID4096"/>
           </a:p>
@@ -871,7 +871,7 @@
           <a:p>
             <a:fld id="{ED9CCB52-56FE-42E5-B0D4-D20410F16FFD}" type="datetimeFigureOut">
               <a:rPr lang="LID4096" smtClean="0"/>
-              <a:t>05/10/2021</a:t>
+              <a:t>08/20/2021</a:t>
             </a:fld>
             <a:endParaRPr lang="LID4096"/>
           </a:p>
@@ -1147,7 +1147,7 @@
           <a:p>
             <a:fld id="{ED9CCB52-56FE-42E5-B0D4-D20410F16FFD}" type="datetimeFigureOut">
               <a:rPr lang="LID4096" smtClean="0"/>
-              <a:t>05/10/2021</a:t>
+              <a:t>08/20/2021</a:t>
             </a:fld>
             <a:endParaRPr lang="LID4096"/>
           </a:p>
@@ -1415,7 +1415,7 @@
           <a:p>
             <a:fld id="{ED9CCB52-56FE-42E5-B0D4-D20410F16FFD}" type="datetimeFigureOut">
               <a:rPr lang="LID4096" smtClean="0"/>
-              <a:t>05/10/2021</a:t>
+              <a:t>08/20/2021</a:t>
             </a:fld>
             <a:endParaRPr lang="LID4096"/>
           </a:p>
@@ -1830,7 +1830,7 @@
           <a:p>
             <a:fld id="{ED9CCB52-56FE-42E5-B0D4-D20410F16FFD}" type="datetimeFigureOut">
               <a:rPr lang="LID4096" smtClean="0"/>
-              <a:t>05/10/2021</a:t>
+              <a:t>08/20/2021</a:t>
             </a:fld>
             <a:endParaRPr lang="LID4096"/>
           </a:p>
@@ -1972,7 +1972,7 @@
           <a:p>
             <a:fld id="{ED9CCB52-56FE-42E5-B0D4-D20410F16FFD}" type="datetimeFigureOut">
               <a:rPr lang="LID4096" smtClean="0"/>
-              <a:t>05/10/2021</a:t>
+              <a:t>08/20/2021</a:t>
             </a:fld>
             <a:endParaRPr lang="LID4096"/>
           </a:p>
@@ -2085,7 +2085,7 @@
           <a:p>
             <a:fld id="{ED9CCB52-56FE-42E5-B0D4-D20410F16FFD}" type="datetimeFigureOut">
               <a:rPr lang="LID4096" smtClean="0"/>
-              <a:t>05/10/2021</a:t>
+              <a:t>08/20/2021</a:t>
             </a:fld>
             <a:endParaRPr lang="LID4096"/>
           </a:p>
@@ -2398,7 +2398,7 @@
           <a:p>
             <a:fld id="{ED9CCB52-56FE-42E5-B0D4-D20410F16FFD}" type="datetimeFigureOut">
               <a:rPr lang="LID4096" smtClean="0"/>
-              <a:t>05/10/2021</a:t>
+              <a:t>08/20/2021</a:t>
             </a:fld>
             <a:endParaRPr lang="LID4096"/>
           </a:p>
@@ -2687,7 +2687,7 @@
           <a:p>
             <a:fld id="{ED9CCB52-56FE-42E5-B0D4-D20410F16FFD}" type="datetimeFigureOut">
               <a:rPr lang="LID4096" smtClean="0"/>
-              <a:t>05/10/2021</a:t>
+              <a:t>08/20/2021</a:t>
             </a:fld>
             <a:endParaRPr lang="LID4096"/>
           </a:p>
@@ -2930,7 +2930,7 @@
           <a:p>
             <a:fld id="{ED9CCB52-56FE-42E5-B0D4-D20410F16FFD}" type="datetimeFigureOut">
               <a:rPr lang="LID4096" smtClean="0"/>
-              <a:t>05/10/2021</a:t>
+              <a:t>08/20/2021</a:t>
             </a:fld>
             <a:endParaRPr lang="LID4096"/>
           </a:p>
@@ -3349,10 +3349,10 @@
       </p:grpSpPr>
       <p:sp>
         <p:nvSpPr>
-          <p:cNvPr id="5" name="Flowchart: Process 4">
-            <a:extLst>
-              <a:ext uri="{FF2B5EF4-FFF2-40B4-BE49-F238E27FC236}">
-                <a16:creationId xmlns:a16="http://schemas.microsoft.com/office/drawing/2014/main" id="{37819B27-5F48-4C54-97CF-C22820C04D92}"/>
+          <p:cNvPr id="8" name="Flowchart: Process 7">
+            <a:extLst>
+              <a:ext uri="{FF2B5EF4-FFF2-40B4-BE49-F238E27FC236}">
+                <a16:creationId xmlns:a16="http://schemas.microsoft.com/office/drawing/2014/main" id="{03BAB23B-1A67-48BF-AF1A-D3CAF2DEB9CC}"/>
               </a:ext>
             </a:extLst>
           </p:cNvPr>
@@ -3361,15 +3361,62 @@
         </p:nvSpPr>
         <p:spPr>
           <a:xfrm>
-            <a:off x="4749567" y="100668"/>
-            <a:ext cx="2457974" cy="538293"/>
+            <a:off x="4749567" y="1943451"/>
+            <a:ext cx="2457974" cy="461394"/>
           </a:xfrm>
           <a:prstGeom prst="flowChartProcess">
             <a:avLst/>
           </a:prstGeom>
-          <a:solidFill>
-            <a:srgbClr val="92D050"/>
-          </a:solidFill>
+        </p:spPr>
+        <p:style>
+          <a:lnRef idx="2">
+            <a:schemeClr val="accent3">
+              <a:shade val="50000"/>
+            </a:schemeClr>
+          </a:lnRef>
+          <a:fillRef idx="1">
+            <a:schemeClr val="accent3"/>
+          </a:fillRef>
+          <a:effectRef idx="0">
+            <a:schemeClr val="accent3"/>
+          </a:effectRef>
+          <a:fontRef idx="minor">
+            <a:schemeClr val="lt1"/>
+          </a:fontRef>
+        </p:style>
+        <p:txBody>
+          <a:bodyPr rtlCol="0" anchor="ctr"/>
+          <a:lstStyle/>
+          <a:p>
+            <a:pPr algn="ctr"/>
+            <a:r>
+              <a:rPr lang="en-US" i="1" dirty="0"/>
+              <a:t>Get plan from database</a:t>
+            </a:r>
+            <a:endParaRPr lang="LID4096" i="1" dirty="0"/>
+          </a:p>
+        </p:txBody>
+      </p:sp>
+      <p:sp>
+        <p:nvSpPr>
+          <p:cNvPr id="9" name="Flowchart: Process 8">
+            <a:extLst>
+              <a:ext uri="{FF2B5EF4-FFF2-40B4-BE49-F238E27FC236}">
+                <a16:creationId xmlns:a16="http://schemas.microsoft.com/office/drawing/2014/main" id="{AF5B5350-83C6-4359-8762-8213AEE64BA4}"/>
+              </a:ext>
+            </a:extLst>
+          </p:cNvPr>
+          <p:cNvSpPr/>
+          <p:nvPr/>
+        </p:nvSpPr>
+        <p:spPr>
+          <a:xfrm>
+            <a:off x="4749567" y="2532079"/>
+            <a:ext cx="2457974" cy="461394"/>
+          </a:xfrm>
+          <a:prstGeom prst="flowChartProcess">
+            <a:avLst/>
+          </a:prstGeom>
         </p:spPr>
         <p:style>
           <a:lnRef idx="2">
@@ -3394,11 +3441,61 @@
             <a:pPr algn="ctr"/>
             <a:r>
               <a:rPr lang="en-US" dirty="0"/>
+              <a:t>“{Plan}”</a:t>
+            </a:r>
+            <a:endParaRPr lang="LID4096" dirty="0"/>
+          </a:p>
+        </p:txBody>
+      </p:sp>
+      <p:sp>
+        <p:nvSpPr>
+          <p:cNvPr id="10" name="Flowchart: Process 9">
+            <a:extLst>
+              <a:ext uri="{FF2B5EF4-FFF2-40B4-BE49-F238E27FC236}">
+                <a16:creationId xmlns:a16="http://schemas.microsoft.com/office/drawing/2014/main" id="{589FF4CF-EF70-456D-A1F5-DAC43B3002D5}"/>
+              </a:ext>
+            </a:extLst>
+          </p:cNvPr>
+          <p:cNvSpPr/>
+          <p:nvPr/>
+        </p:nvSpPr>
+        <p:spPr>
+          <a:xfrm>
+            <a:off x="4749567" y="3126996"/>
+            <a:ext cx="2457974" cy="737532"/>
+          </a:xfrm>
+          <a:prstGeom prst="flowChartProcess">
+            <a:avLst/>
+          </a:prstGeom>
+        </p:spPr>
+        <p:style>
+          <a:lnRef idx="2">
+            <a:schemeClr val="accent1">
+              <a:shade val="50000"/>
+            </a:schemeClr>
+          </a:lnRef>
+          <a:fillRef idx="1">
+            <a:schemeClr val="accent1"/>
+          </a:fillRef>
+          <a:effectRef idx="0">
+            <a:schemeClr val="accent1"/>
+          </a:effectRef>
+          <a:fontRef idx="minor">
+            <a:schemeClr val="lt1"/>
+          </a:fontRef>
+        </p:style>
+        <p:txBody>
+          <a:bodyPr rtlCol="0" anchor="ctr"/>
+          <a:lstStyle/>
+          <a:p>
+            <a:pPr algn="ctr"/>
+            <a:r>
+              <a:rPr lang="en-US" dirty="0"/>
               <a:t>“</a:t>
             </a:r>
             <a:r>
               <a:rPr lang="nl-NL" dirty="0"/>
-              <a:t>Kan ik de agende voor de week krijgen</a:t>
+              <a:t>Zal ik de planning in je NiceDay agenda zetten</a:t>
             </a:r>
             <a:r>
               <a:rPr lang="en-US" dirty="0"/>
@@ -3410,10 +3507,10 @@
       </p:sp>
       <p:sp>
         <p:nvSpPr>
-          <p:cNvPr id="6" name="Flowchart: Process 5">
-            <a:extLst>
-              <a:ext uri="{FF2B5EF4-FFF2-40B4-BE49-F238E27FC236}">
-                <a16:creationId xmlns:a16="http://schemas.microsoft.com/office/drawing/2014/main" id="{57C1DDEC-0178-4CC9-924F-A15E28077D09}"/>
+          <p:cNvPr id="11" name="Flowchart: Process 10">
+            <a:extLst>
+              <a:ext uri="{FF2B5EF4-FFF2-40B4-BE49-F238E27FC236}">
+                <a16:creationId xmlns:a16="http://schemas.microsoft.com/office/drawing/2014/main" id="{83520A0A-6B90-416E-8DC1-027BAAE0012D}"/>
               </a:ext>
             </a:extLst>
           </p:cNvPr>
@@ -3422,7 +3519,113 @@
         </p:nvSpPr>
         <p:spPr>
           <a:xfrm>
-            <a:off x="4749567" y="766195"/>
+            <a:off x="1470869" y="4003300"/>
+            <a:ext cx="2457974" cy="461394"/>
+          </a:xfrm>
+          <a:prstGeom prst="flowChartProcess">
+            <a:avLst/>
+          </a:prstGeom>
+          <a:solidFill>
+            <a:srgbClr val="92D050"/>
+          </a:solidFill>
+        </p:spPr>
+        <p:style>
+          <a:lnRef idx="2">
+            <a:schemeClr val="accent1">
+              <a:shade val="50000"/>
+            </a:schemeClr>
+          </a:lnRef>
+          <a:fillRef idx="1">
+            <a:schemeClr val="accent1"/>
+          </a:fillRef>
+          <a:effectRef idx="0">
+            <a:schemeClr val="accent1"/>
+          </a:effectRef>
+          <a:fontRef idx="minor">
+            <a:schemeClr val="lt1"/>
+          </a:fontRef>
+        </p:style>
+        <p:txBody>
+          <a:bodyPr rtlCol="0" anchor="ctr"/>
+          <a:lstStyle/>
+          <a:p>
+            <a:pPr algn="ctr"/>
+            <a:r>
+              <a:rPr lang="en-US" dirty="0"/>
+              <a:t>“Ja”</a:t>
+            </a:r>
+            <a:endParaRPr lang="LID4096" dirty="0"/>
+          </a:p>
+        </p:txBody>
+      </p:sp>
+      <p:sp>
+        <p:nvSpPr>
+          <p:cNvPr id="12" name="Flowchart: Process 11">
+            <a:extLst>
+              <a:ext uri="{FF2B5EF4-FFF2-40B4-BE49-F238E27FC236}">
+                <a16:creationId xmlns:a16="http://schemas.microsoft.com/office/drawing/2014/main" id="{481D3CB6-D7FE-44CB-BDF1-8145AE9231C5}"/>
+              </a:ext>
+            </a:extLst>
+          </p:cNvPr>
+          <p:cNvSpPr/>
+          <p:nvPr/>
+        </p:nvSpPr>
+        <p:spPr>
+          <a:xfrm>
+            <a:off x="8263157" y="4003300"/>
+            <a:ext cx="2457974" cy="461394"/>
+          </a:xfrm>
+          <a:prstGeom prst="flowChartProcess">
+            <a:avLst/>
+          </a:prstGeom>
+          <a:solidFill>
+            <a:srgbClr val="92D050"/>
+          </a:solidFill>
+        </p:spPr>
+        <p:style>
+          <a:lnRef idx="2">
+            <a:schemeClr val="accent1">
+              <a:shade val="50000"/>
+            </a:schemeClr>
+          </a:lnRef>
+          <a:fillRef idx="1">
+            <a:schemeClr val="accent1"/>
+          </a:fillRef>
+          <a:effectRef idx="0">
+            <a:schemeClr val="accent1"/>
+          </a:effectRef>
+          <a:fontRef idx="minor">
+            <a:schemeClr val="lt1"/>
+          </a:fontRef>
+        </p:style>
+        <p:txBody>
+          <a:bodyPr rtlCol="0" anchor="ctr"/>
+          <a:lstStyle/>
+          <a:p>
+            <a:pPr algn="ctr"/>
+            <a:r>
+              <a:rPr lang="en-US" dirty="0"/>
+              <a:t>“Nee”</a:t>
+            </a:r>
+            <a:endParaRPr lang="LID4096" dirty="0"/>
+          </a:p>
+        </p:txBody>
+      </p:sp>
+      <p:sp>
+        <p:nvSpPr>
+          <p:cNvPr id="13" name="Flowchart: Process 12">
+            <a:extLst>
+              <a:ext uri="{FF2B5EF4-FFF2-40B4-BE49-F238E27FC236}">
+                <a16:creationId xmlns:a16="http://schemas.microsoft.com/office/drawing/2014/main" id="{6252674E-1157-423C-8041-21EA6008ECDD}"/>
+              </a:ext>
+            </a:extLst>
+          </p:cNvPr>
+          <p:cNvSpPr/>
+          <p:nvPr/>
+        </p:nvSpPr>
+        <p:spPr>
+          <a:xfrm>
+            <a:off x="1483453" y="4606259"/>
             <a:ext cx="2457974" cy="461394"/>
           </a:xfrm>
           <a:prstGeom prst="flowChartProcess">
@@ -3452,7 +3655,7 @@
             <a:pPr algn="ctr"/>
             <a:r>
               <a:rPr lang="en-US" i="1" dirty="0"/>
-              <a:t>Get name from database</a:t>
+              <a:t>Save plan in calendar</a:t>
             </a:r>
             <a:endParaRPr lang="LID4096" i="1" dirty="0"/>
           </a:p>
@@ -3460,10 +3663,10 @@
       </p:sp>
       <p:sp>
         <p:nvSpPr>
-          <p:cNvPr id="7" name="Flowchart: Process 6">
-            <a:extLst>
-              <a:ext uri="{FF2B5EF4-FFF2-40B4-BE49-F238E27FC236}">
-                <a16:creationId xmlns:a16="http://schemas.microsoft.com/office/drawing/2014/main" id="{300CD54B-1BAF-4A00-84B5-8DD940917735}"/>
+          <p:cNvPr id="16" name="Flowchart: Process 15">
+            <a:extLst>
+              <a:ext uri="{FF2B5EF4-FFF2-40B4-BE49-F238E27FC236}">
+                <a16:creationId xmlns:a16="http://schemas.microsoft.com/office/drawing/2014/main" id="{1AC773F1-A454-4351-B55A-ACB157D0404C}"/>
               </a:ext>
             </a:extLst>
           </p:cNvPr>
@@ -3472,7 +3675,7 @@
         </p:nvSpPr>
         <p:spPr>
           <a:xfrm>
-            <a:off x="4749567" y="1354823"/>
+            <a:off x="8263157" y="4606259"/>
             <a:ext cx="2457974" cy="461394"/>
           </a:xfrm>
           <a:prstGeom prst="flowChartProcess">
@@ -3502,7 +3705,7 @@
             <a:pPr algn="ctr"/>
             <a:r>
               <a:rPr lang="en-US" dirty="0"/>
-              <a:t>“Hi {name}!”</a:t>
+              <a:t>“Okay!”</a:t>
             </a:r>
             <a:endParaRPr lang="LID4096" dirty="0"/>
           </a:p>
@@ -3510,10 +3713,10 @@
       </p:sp>
       <p:sp>
         <p:nvSpPr>
-          <p:cNvPr id="8" name="Flowchart: Process 7">
-            <a:extLst>
-              <a:ext uri="{FF2B5EF4-FFF2-40B4-BE49-F238E27FC236}">
-                <a16:creationId xmlns:a16="http://schemas.microsoft.com/office/drawing/2014/main" id="{03BAB23B-1A67-48BF-AF1A-D3CAF2DEB9CC}"/>
+          <p:cNvPr id="17" name="Flowchart: Process 16">
+            <a:extLst>
+              <a:ext uri="{FF2B5EF4-FFF2-40B4-BE49-F238E27FC236}">
+                <a16:creationId xmlns:a16="http://schemas.microsoft.com/office/drawing/2014/main" id="{AC341520-65EE-4457-A6BD-3FB284FF135A}"/>
               </a:ext>
             </a:extLst>
           </p:cNvPr>
@@ -3522,58 +3725,8 @@
         </p:nvSpPr>
         <p:spPr>
           <a:xfrm>
-            <a:off x="4749567" y="1943451"/>
-            <a:ext cx="2457974" cy="461394"/>
-          </a:xfrm>
-          <a:prstGeom prst="flowChartProcess">
-            <a:avLst/>
-          </a:prstGeom>
-        </p:spPr>
-        <p:style>
-          <a:lnRef idx="2">
-            <a:schemeClr val="accent3">
-              <a:shade val="50000"/>
-            </a:schemeClr>
-          </a:lnRef>
-          <a:fillRef idx="1">
-            <a:schemeClr val="accent3"/>
-          </a:fillRef>
-          <a:effectRef idx="0">
-            <a:schemeClr val="accent3"/>
-          </a:effectRef>
-          <a:fontRef idx="minor">
-            <a:schemeClr val="lt1"/>
-          </a:fontRef>
-        </p:style>
-        <p:txBody>
-          <a:bodyPr rtlCol="0" anchor="ctr"/>
-          <a:lstStyle/>
-          <a:p>
-            <a:pPr algn="ctr"/>
-            <a:r>
-              <a:rPr lang="en-US" i="1" dirty="0"/>
-              <a:t>Get plan from database</a:t>
-            </a:r>
-            <a:endParaRPr lang="LID4096" i="1" dirty="0"/>
-          </a:p>
-        </p:txBody>
-      </p:sp>
-      <p:sp>
-        <p:nvSpPr>
-          <p:cNvPr id="9" name="Flowchart: Process 8">
-            <a:extLst>
-              <a:ext uri="{FF2B5EF4-FFF2-40B4-BE49-F238E27FC236}">
-                <a16:creationId xmlns:a16="http://schemas.microsoft.com/office/drawing/2014/main" id="{AF5B5350-83C6-4359-8762-8213AEE64BA4}"/>
-              </a:ext>
-            </a:extLst>
-          </p:cNvPr>
-          <p:cNvSpPr/>
-          <p:nvPr/>
-        </p:nvSpPr>
-        <p:spPr>
-          <a:xfrm>
-            <a:off x="4749567" y="2532079"/>
-            <a:ext cx="2457974" cy="461394"/>
+            <a:off x="0" y="5568893"/>
+            <a:ext cx="2457974" cy="890630"/>
           </a:xfrm>
           <a:prstGeom prst="flowChartProcess">
             <a:avLst/>
@@ -3601,8 +3754,12 @@
           <a:p>
             <a:pPr algn="ctr"/>
             <a:r>
+              <a:rPr lang="nl-NL" dirty="0"/>
+              <a:t>“Okay, de planning staat nu in je NiceDay agenda</a:t>
+            </a:r>
+            <a:r>
               <a:rPr lang="en-US" dirty="0"/>
-              <a:t>“{Plan}”</a:t>
+              <a:t>.”</a:t>
             </a:r>
             <a:endParaRPr lang="LID4096" dirty="0"/>
           </a:p>
@@ -3610,10 +3767,10 @@
       </p:sp>
       <p:sp>
         <p:nvSpPr>
-          <p:cNvPr id="10" name="Flowchart: Process 9">
-            <a:extLst>
-              <a:ext uri="{FF2B5EF4-FFF2-40B4-BE49-F238E27FC236}">
-                <a16:creationId xmlns:a16="http://schemas.microsoft.com/office/drawing/2014/main" id="{589FF4CF-EF70-456D-A1F5-DAC43B3002D5}"/>
+          <p:cNvPr id="18" name="Flowchart: Process 17">
+            <a:extLst>
+              <a:ext uri="{FF2B5EF4-FFF2-40B4-BE49-F238E27FC236}">
+                <a16:creationId xmlns:a16="http://schemas.microsoft.com/office/drawing/2014/main" id="{BCF873E3-548B-4F27-B139-2095F8D74F6A}"/>
               </a:ext>
             </a:extLst>
           </p:cNvPr>
@@ -3622,8 +3779,8 @@
         </p:nvSpPr>
         <p:spPr>
           <a:xfrm>
-            <a:off x="4749567" y="3126996"/>
-            <a:ext cx="2457974" cy="737532"/>
+            <a:off x="2931952" y="5568893"/>
+            <a:ext cx="2457974" cy="1045823"/>
           </a:xfrm>
           <a:prstGeom prst="flowChartProcess">
             <a:avLst/>
@@ -3656,267 +3813,7 @@
             </a:r>
             <a:r>
               <a:rPr lang="nl-NL" dirty="0"/>
-              <a:t>Zal ik de planning in je NiceDay agenda zetten</a:t>
-            </a:r>
-            <a:r>
-              <a:rPr lang="en-US" dirty="0"/>
-              <a:t>?”</a:t>
-            </a:r>
-            <a:endParaRPr lang="LID4096" dirty="0"/>
-          </a:p>
-        </p:txBody>
-      </p:sp>
-      <p:sp>
-        <p:nvSpPr>
-          <p:cNvPr id="11" name="Flowchart: Process 10">
-            <a:extLst>
-              <a:ext uri="{FF2B5EF4-FFF2-40B4-BE49-F238E27FC236}">
-                <a16:creationId xmlns:a16="http://schemas.microsoft.com/office/drawing/2014/main" id="{83520A0A-6B90-416E-8DC1-027BAAE0012D}"/>
-              </a:ext>
-            </a:extLst>
-          </p:cNvPr>
-          <p:cNvSpPr/>
-          <p:nvPr/>
-        </p:nvSpPr>
-        <p:spPr>
-          <a:xfrm>
-            <a:off x="1470869" y="4003300"/>
-            <a:ext cx="2457974" cy="461394"/>
-          </a:xfrm>
-          <a:prstGeom prst="flowChartProcess">
-            <a:avLst/>
-          </a:prstGeom>
-          <a:solidFill>
-            <a:srgbClr val="92D050"/>
-          </a:solidFill>
-        </p:spPr>
-        <p:style>
-          <a:lnRef idx="2">
-            <a:schemeClr val="accent1">
-              <a:shade val="50000"/>
-            </a:schemeClr>
-          </a:lnRef>
-          <a:fillRef idx="1">
-            <a:schemeClr val="accent1"/>
-          </a:fillRef>
-          <a:effectRef idx="0">
-            <a:schemeClr val="accent1"/>
-          </a:effectRef>
-          <a:fontRef idx="minor">
-            <a:schemeClr val="lt1"/>
-          </a:fontRef>
-        </p:style>
-        <p:txBody>
-          <a:bodyPr rtlCol="0" anchor="ctr"/>
-          <a:lstStyle/>
-          <a:p>
-            <a:pPr algn="ctr"/>
-            <a:r>
-              <a:rPr lang="en-US" dirty="0"/>
-              <a:t>“Ja”</a:t>
-            </a:r>
-            <a:endParaRPr lang="LID4096" dirty="0"/>
-          </a:p>
-        </p:txBody>
-      </p:sp>
-      <p:sp>
-        <p:nvSpPr>
-          <p:cNvPr id="12" name="Flowchart: Process 11">
-            <a:extLst>
-              <a:ext uri="{FF2B5EF4-FFF2-40B4-BE49-F238E27FC236}">
-                <a16:creationId xmlns:a16="http://schemas.microsoft.com/office/drawing/2014/main" id="{481D3CB6-D7FE-44CB-BDF1-8145AE9231C5}"/>
-              </a:ext>
-            </a:extLst>
-          </p:cNvPr>
-          <p:cNvSpPr/>
-          <p:nvPr/>
-        </p:nvSpPr>
-        <p:spPr>
-          <a:xfrm>
-            <a:off x="8263157" y="4003300"/>
-            <a:ext cx="2457974" cy="461394"/>
-          </a:xfrm>
-          <a:prstGeom prst="flowChartProcess">
-            <a:avLst/>
-          </a:prstGeom>
-          <a:solidFill>
-            <a:srgbClr val="92D050"/>
-          </a:solidFill>
-        </p:spPr>
-        <p:style>
-          <a:lnRef idx="2">
-            <a:schemeClr val="accent1">
-              <a:shade val="50000"/>
-            </a:schemeClr>
-          </a:lnRef>
-          <a:fillRef idx="1">
-            <a:schemeClr val="accent1"/>
-          </a:fillRef>
-          <a:effectRef idx="0">
-            <a:schemeClr val="accent1"/>
-          </a:effectRef>
-          <a:fontRef idx="minor">
-            <a:schemeClr val="lt1"/>
-          </a:fontRef>
-        </p:style>
-        <p:txBody>
-          <a:bodyPr rtlCol="0" anchor="ctr"/>
-          <a:lstStyle/>
-          <a:p>
-            <a:pPr algn="ctr"/>
-            <a:r>
-              <a:rPr lang="en-US" dirty="0"/>
-              <a:t>“Nee”</a:t>
-            </a:r>
-            <a:endParaRPr lang="LID4096" dirty="0"/>
-          </a:p>
-        </p:txBody>
-      </p:sp>
-      <p:sp>
-        <p:nvSpPr>
-          <p:cNvPr id="13" name="Flowchart: Process 12">
-            <a:extLst>
-              <a:ext uri="{FF2B5EF4-FFF2-40B4-BE49-F238E27FC236}">
-                <a16:creationId xmlns:a16="http://schemas.microsoft.com/office/drawing/2014/main" id="{6252674E-1157-423C-8041-21EA6008ECDD}"/>
-              </a:ext>
-            </a:extLst>
-          </p:cNvPr>
-          <p:cNvSpPr/>
-          <p:nvPr/>
-        </p:nvSpPr>
-        <p:spPr>
-          <a:xfrm>
-            <a:off x="1483453" y="4606259"/>
-            <a:ext cx="2457974" cy="461394"/>
-          </a:xfrm>
-          <a:prstGeom prst="flowChartProcess">
-            <a:avLst/>
-          </a:prstGeom>
-        </p:spPr>
-        <p:style>
-          <a:lnRef idx="2">
-            <a:schemeClr val="accent3">
-              <a:shade val="50000"/>
-            </a:schemeClr>
-          </a:lnRef>
-          <a:fillRef idx="1">
-            <a:schemeClr val="accent3"/>
-          </a:fillRef>
-          <a:effectRef idx="0">
-            <a:schemeClr val="accent3"/>
-          </a:effectRef>
-          <a:fontRef idx="minor">
-            <a:schemeClr val="lt1"/>
-          </a:fontRef>
-        </p:style>
-        <p:txBody>
-          <a:bodyPr rtlCol="0" anchor="ctr"/>
-          <a:lstStyle/>
-          <a:p>
-            <a:pPr algn="ctr"/>
-            <a:r>
-              <a:rPr lang="en-US" i="1" dirty="0"/>
-              <a:t>Save plan in calendar</a:t>
-            </a:r>
-            <a:endParaRPr lang="LID4096" i="1" dirty="0"/>
-          </a:p>
-        </p:txBody>
-      </p:sp>
-      <p:sp>
-        <p:nvSpPr>
-          <p:cNvPr id="16" name="Flowchart: Process 15">
-            <a:extLst>
-              <a:ext uri="{FF2B5EF4-FFF2-40B4-BE49-F238E27FC236}">
-                <a16:creationId xmlns:a16="http://schemas.microsoft.com/office/drawing/2014/main" id="{1AC773F1-A454-4351-B55A-ACB157D0404C}"/>
-              </a:ext>
-            </a:extLst>
-          </p:cNvPr>
-          <p:cNvSpPr/>
-          <p:nvPr/>
-        </p:nvSpPr>
-        <p:spPr>
-          <a:xfrm>
-            <a:off x="8263157" y="4606259"/>
-            <a:ext cx="2457974" cy="461394"/>
-          </a:xfrm>
-          <a:prstGeom prst="flowChartProcess">
-            <a:avLst/>
-          </a:prstGeom>
-        </p:spPr>
-        <p:style>
-          <a:lnRef idx="2">
-            <a:schemeClr val="accent1">
-              <a:shade val="50000"/>
-            </a:schemeClr>
-          </a:lnRef>
-          <a:fillRef idx="1">
-            <a:schemeClr val="accent1"/>
-          </a:fillRef>
-          <a:effectRef idx="0">
-            <a:schemeClr val="accent1"/>
-          </a:effectRef>
-          <a:fontRef idx="minor">
-            <a:schemeClr val="lt1"/>
-          </a:fontRef>
-        </p:style>
-        <p:txBody>
-          <a:bodyPr rtlCol="0" anchor="ctr"/>
-          <a:lstStyle/>
-          <a:p>
-            <a:pPr algn="ctr"/>
-            <a:r>
-              <a:rPr lang="en-US" dirty="0"/>
-              <a:t>“Okay!”</a:t>
-            </a:r>
-            <a:endParaRPr lang="LID4096" dirty="0"/>
-          </a:p>
-        </p:txBody>
-      </p:sp>
-      <p:sp>
-        <p:nvSpPr>
-          <p:cNvPr id="17" name="Flowchart: Process 16">
-            <a:extLst>
-              <a:ext uri="{FF2B5EF4-FFF2-40B4-BE49-F238E27FC236}">
-                <a16:creationId xmlns:a16="http://schemas.microsoft.com/office/drawing/2014/main" id="{AC341520-65EE-4457-A6BD-3FB284FF135A}"/>
-              </a:ext>
-            </a:extLst>
-          </p:cNvPr>
-          <p:cNvSpPr/>
-          <p:nvPr/>
-        </p:nvSpPr>
-        <p:spPr>
-          <a:xfrm>
-            <a:off x="0" y="5568893"/>
-            <a:ext cx="2457974" cy="890630"/>
-          </a:xfrm>
-          <a:prstGeom prst="flowChartProcess">
-            <a:avLst/>
-          </a:prstGeom>
-        </p:spPr>
-        <p:style>
-          <a:lnRef idx="2">
-            <a:schemeClr val="accent1">
-              <a:shade val="50000"/>
-            </a:schemeClr>
-          </a:lnRef>
-          <a:fillRef idx="1">
-            <a:schemeClr val="accent1"/>
-          </a:fillRef>
-          <a:effectRef idx="0">
-            <a:schemeClr val="accent1"/>
-          </a:effectRef>
-          <a:fontRef idx="minor">
-            <a:schemeClr val="lt1"/>
-          </a:fontRef>
-        </p:style>
-        <p:txBody>
-          <a:bodyPr rtlCol="0" anchor="ctr"/>
-          <a:lstStyle/>
-          <a:p>
-            <a:pPr algn="ctr"/>
-            <a:r>
-              <a:rPr lang="nl-NL" dirty="0"/>
-              <a:t>“Okay, de planning staat nu in je NiceDay agenda</a:t>
+              <a:t>Sorry, ik kan de planning nu niet invoeren</a:t>
             </a:r>
             <a:r>
               <a:rPr lang="en-US" dirty="0"/>
@@ -3926,202 +3823,6 @@
           </a:p>
         </p:txBody>
       </p:sp>
-      <p:sp>
-        <p:nvSpPr>
-          <p:cNvPr id="18" name="Flowchart: Process 17">
-            <a:extLst>
-              <a:ext uri="{FF2B5EF4-FFF2-40B4-BE49-F238E27FC236}">
-                <a16:creationId xmlns:a16="http://schemas.microsoft.com/office/drawing/2014/main" id="{BCF873E3-548B-4F27-B139-2095F8D74F6A}"/>
-              </a:ext>
-            </a:extLst>
-          </p:cNvPr>
-          <p:cNvSpPr/>
-          <p:nvPr/>
-        </p:nvSpPr>
-        <p:spPr>
-          <a:xfrm>
-            <a:off x="2931952" y="5568893"/>
-            <a:ext cx="2457974" cy="1045823"/>
-          </a:xfrm>
-          <a:prstGeom prst="flowChartProcess">
-            <a:avLst/>
-          </a:prstGeom>
-        </p:spPr>
-        <p:style>
-          <a:lnRef idx="2">
-            <a:schemeClr val="accent1">
-              <a:shade val="50000"/>
-            </a:schemeClr>
-          </a:lnRef>
-          <a:fillRef idx="1">
-            <a:schemeClr val="accent1"/>
-          </a:fillRef>
-          <a:effectRef idx="0">
-            <a:schemeClr val="accent1"/>
-          </a:effectRef>
-          <a:fontRef idx="minor">
-            <a:schemeClr val="lt1"/>
-          </a:fontRef>
-        </p:style>
-        <p:txBody>
-          <a:bodyPr rtlCol="0" anchor="ctr"/>
-          <a:lstStyle/>
-          <a:p>
-            <a:pPr algn="ctr"/>
-            <a:r>
-              <a:rPr lang="en-US" dirty="0"/>
-              <a:t>“</a:t>
-            </a:r>
-            <a:r>
-              <a:rPr lang="nl-NL" dirty="0"/>
-              <a:t>Sorry, ik kan de planning nu niet invoeren</a:t>
-            </a:r>
-            <a:r>
-              <a:rPr lang="en-US" dirty="0"/>
-              <a:t>.”</a:t>
-            </a:r>
-            <a:endParaRPr lang="LID4096" dirty="0"/>
-          </a:p>
-        </p:txBody>
-      </p:sp>
-      <p:cxnSp>
-        <p:nvCxnSpPr>
-          <p:cNvPr id="20" name="Straight Arrow Connector 19">
-            <a:extLst>
-              <a:ext uri="{FF2B5EF4-FFF2-40B4-BE49-F238E27FC236}">
-                <a16:creationId xmlns:a16="http://schemas.microsoft.com/office/drawing/2014/main" id="{B7D9E79B-1BBE-4B85-9382-614A591600E9}"/>
-              </a:ext>
-            </a:extLst>
-          </p:cNvPr>
-          <p:cNvCxnSpPr>
-            <a:cxnSpLocks/>
-            <a:stCxn id="5" idx="2"/>
-            <a:endCxn id="6" idx="0"/>
-          </p:cNvCxnSpPr>
-          <p:nvPr/>
-        </p:nvCxnSpPr>
-        <p:spPr>
-          <a:xfrm>
-            <a:off x="5978554" y="638961"/>
-            <a:ext cx="0" cy="127234"/>
-          </a:xfrm>
-          <a:prstGeom prst="straightConnector1">
-            <a:avLst/>
-          </a:prstGeom>
-          <a:ln w="38100">
-            <a:solidFill>
-              <a:schemeClr val="tx1"/>
-            </a:solidFill>
-            <a:tailEnd type="triangle"/>
-          </a:ln>
-        </p:spPr>
-        <p:style>
-          <a:lnRef idx="1">
-            <a:schemeClr val="accent1"/>
-          </a:lnRef>
-          <a:fillRef idx="0">
-            <a:schemeClr val="accent1"/>
-          </a:fillRef>
-          <a:effectRef idx="0">
-            <a:schemeClr val="accent1"/>
-          </a:effectRef>
-          <a:fontRef idx="minor">
-            <a:schemeClr val="tx1"/>
-          </a:fontRef>
-        </p:style>
-      </p:cxnSp>
-      <p:cxnSp>
-        <p:nvCxnSpPr>
-          <p:cNvPr id="21" name="Straight Arrow Connector 20">
-            <a:extLst>
-              <a:ext uri="{FF2B5EF4-FFF2-40B4-BE49-F238E27FC236}">
-                <a16:creationId xmlns:a16="http://schemas.microsoft.com/office/drawing/2014/main" id="{C4E27093-2523-4AFA-9872-89E97D0F427D}"/>
-              </a:ext>
-            </a:extLst>
-          </p:cNvPr>
-          <p:cNvCxnSpPr>
-            <a:cxnSpLocks/>
-            <a:stCxn id="6" idx="2"/>
-            <a:endCxn id="7" idx="0"/>
-          </p:cNvCxnSpPr>
-          <p:nvPr/>
-        </p:nvCxnSpPr>
-        <p:spPr>
-          <a:xfrm>
-            <a:off x="5978554" y="1227589"/>
-            <a:ext cx="0" cy="127234"/>
-          </a:xfrm>
-          <a:prstGeom prst="straightConnector1">
-            <a:avLst/>
-          </a:prstGeom>
-          <a:ln w="38100">
-            <a:solidFill>
-              <a:schemeClr val="tx1"/>
-            </a:solidFill>
-            <a:tailEnd type="triangle"/>
-          </a:ln>
-        </p:spPr>
-        <p:style>
-          <a:lnRef idx="1">
-            <a:schemeClr val="accent1"/>
-          </a:lnRef>
-          <a:fillRef idx="0">
-            <a:schemeClr val="accent1"/>
-          </a:fillRef>
-          <a:effectRef idx="0">
-            <a:schemeClr val="accent1"/>
-          </a:effectRef>
-          <a:fontRef idx="minor">
-            <a:schemeClr val="tx1"/>
-          </a:fontRef>
-        </p:style>
-      </p:cxnSp>
-      <p:cxnSp>
-        <p:nvCxnSpPr>
-          <p:cNvPr id="24" name="Straight Arrow Connector 23">
-            <a:extLst>
-              <a:ext uri="{FF2B5EF4-FFF2-40B4-BE49-F238E27FC236}">
-                <a16:creationId xmlns:a16="http://schemas.microsoft.com/office/drawing/2014/main" id="{1D31C93D-73A8-4102-A129-6848686F2FCF}"/>
-              </a:ext>
-            </a:extLst>
-          </p:cNvPr>
-          <p:cNvCxnSpPr>
-            <a:cxnSpLocks/>
-            <a:stCxn id="7" idx="2"/>
-            <a:endCxn id="8" idx="0"/>
-          </p:cNvCxnSpPr>
-          <p:nvPr/>
-        </p:nvCxnSpPr>
-        <p:spPr>
-          <a:xfrm>
-            <a:off x="5978554" y="1816217"/>
-            <a:ext cx="0" cy="127234"/>
-          </a:xfrm>
-          <a:prstGeom prst="straightConnector1">
-            <a:avLst/>
-          </a:prstGeom>
-          <a:ln w="38100">
-            <a:solidFill>
-              <a:schemeClr val="tx1"/>
-            </a:solidFill>
-            <a:tailEnd type="triangle"/>
-          </a:ln>
-        </p:spPr>
-        <p:style>
-          <a:lnRef idx="1">
-            <a:schemeClr val="accent1"/>
-          </a:lnRef>
-          <a:fillRef idx="0">
-            <a:schemeClr val="accent1"/>
-          </a:fillRef>
-          <a:effectRef idx="0">
-            <a:schemeClr val="accent1"/>
-          </a:effectRef>
-          <a:fontRef idx="minor">
-            <a:schemeClr val="tx1"/>
-          </a:fontRef>
-        </p:style>
-      </p:cxnSp>
       <p:cxnSp>
         <p:nvCxnSpPr>
           <p:cNvPr id="27" name="Straight Arrow Connector 26">
@@ -4810,6 +4511,112 @@
           </a:p>
         </p:txBody>
       </p:sp>
+      <p:sp>
+        <p:nvSpPr>
+          <p:cNvPr id="38" name="Flowchart: Process 37">
+            <a:extLst>
+              <a:ext uri="{FF2B5EF4-FFF2-40B4-BE49-F238E27FC236}">
+                <a16:creationId xmlns:a16="http://schemas.microsoft.com/office/drawing/2014/main" id="{37819B27-5F48-4C54-97CF-C22820C04D92}"/>
+              </a:ext>
+            </a:extLst>
+          </p:cNvPr>
+          <p:cNvSpPr/>
+          <p:nvPr/>
+        </p:nvSpPr>
+        <p:spPr>
+          <a:xfrm>
+            <a:off x="4749567" y="1273683"/>
+            <a:ext cx="2457974" cy="538293"/>
+          </a:xfrm>
+          <a:prstGeom prst="flowChartProcess">
+            <a:avLst/>
+          </a:prstGeom>
+          <a:solidFill>
+            <a:srgbClr val="92D050"/>
+          </a:solidFill>
+        </p:spPr>
+        <p:style>
+          <a:lnRef idx="2">
+            <a:schemeClr val="accent1">
+              <a:shade val="50000"/>
+            </a:schemeClr>
+          </a:lnRef>
+          <a:fillRef idx="1">
+            <a:schemeClr val="accent1"/>
+          </a:fillRef>
+          <a:effectRef idx="0">
+            <a:schemeClr val="accent1"/>
+          </a:effectRef>
+          <a:fontRef idx="minor">
+            <a:schemeClr val="lt1"/>
+          </a:fontRef>
+        </p:style>
+        <p:txBody>
+          <a:bodyPr rtlCol="0" anchor="ctr"/>
+          <a:lstStyle/>
+          <a:p>
+            <a:pPr algn="ctr"/>
+            <a:r>
+              <a:rPr lang="en-US" dirty="0"/>
+              <a:t>“</a:t>
+            </a:r>
+            <a:r>
+              <a:rPr lang="nl-NL" dirty="0"/>
+              <a:t>Kan ik de agende voor de week krijgen</a:t>
+            </a:r>
+            <a:r>
+              <a:rPr lang="en-US" dirty="0"/>
+              <a:t>?”</a:t>
+            </a:r>
+            <a:endParaRPr lang="LID4096" dirty="0"/>
+          </a:p>
+        </p:txBody>
+      </p:sp>
+      <p:cxnSp>
+        <p:nvCxnSpPr>
+          <p:cNvPr id="40" name="Straight Arrow Connector 39">
+            <a:extLst>
+              <a:ext uri="{FF2B5EF4-FFF2-40B4-BE49-F238E27FC236}">
+                <a16:creationId xmlns:a16="http://schemas.microsoft.com/office/drawing/2014/main" id="{B7D9E79B-1BBE-4B85-9382-614A591600E9}"/>
+              </a:ext>
+            </a:extLst>
+          </p:cNvPr>
+          <p:cNvCxnSpPr>
+            <a:cxnSpLocks/>
+            <a:stCxn id="38" idx="2"/>
+          </p:cNvCxnSpPr>
+          <p:nvPr/>
+        </p:nvCxnSpPr>
+        <p:spPr>
+          <a:xfrm>
+            <a:off x="5978554" y="1811976"/>
+            <a:ext cx="0" cy="127234"/>
+          </a:xfrm>
+          <a:prstGeom prst="straightConnector1">
+            <a:avLst/>
+          </a:prstGeom>
+          <a:ln w="38100">
+            <a:solidFill>
+              <a:schemeClr val="tx1"/>
+            </a:solidFill>
+            <a:tailEnd type="triangle"/>
+          </a:ln>
+        </p:spPr>
+        <p:style>
+          <a:lnRef idx="1">
+            <a:schemeClr val="accent1"/>
+          </a:lnRef>
+          <a:fillRef idx="0">
+            <a:schemeClr val="accent1"/>
+          </a:fillRef>
+          <a:effectRef idx="0">
+            <a:schemeClr val="accent1"/>
+          </a:effectRef>
+          <a:fontRef idx="minor">
+            <a:schemeClr val="tx1"/>
+          </a:fontRef>
+        </p:style>
+      </p:cxnSp>
     </p:spTree>
     <p:extLst>
       <p:ext uri="{BB962C8B-B14F-4D97-AF65-F5344CB8AC3E}">

</xml_diff>